<commit_message>
Changed the pIDDT to include only the models in the paper
</commit_message>
<xml_diff>
--- a/MD simualtions/MD models pLDDTs/pLDDT collage.pptx
+++ b/MD simualtions/MD models pLDDTs/pLDDT collage.pptx
@@ -7,7 +7,6 @@
   <p:sldIdLst>
     <p:sldId id="256" r:id="rId2"/>
     <p:sldId id="257" r:id="rId3"/>
-    <p:sldId id="258" r:id="rId4"/>
   </p:sldIdLst>
   <p:sldSz cx="6858000" cy="9906000" type="A4"/>
   <p:notesSz cx="6858000" cy="9144000"/>
@@ -256,7 +255,7 @@
           <a:p>
             <a:fld id="{8AAFBEC0-8583-44F4-923A-7642A0EA0A70}" type="datetimeFigureOut">
               <a:rPr lang="de-CH" smtClean="0"/>
-              <a:t>27.03.2024</a:t>
+              <a:t>31.05.2024</a:t>
             </a:fld>
             <a:endParaRPr lang="de-CH"/>
           </a:p>
@@ -426,7 +425,7 @@
           <a:p>
             <a:fld id="{8AAFBEC0-8583-44F4-923A-7642A0EA0A70}" type="datetimeFigureOut">
               <a:rPr lang="de-CH" smtClean="0"/>
-              <a:t>27.03.2024</a:t>
+              <a:t>31.05.2024</a:t>
             </a:fld>
             <a:endParaRPr lang="de-CH"/>
           </a:p>
@@ -606,7 +605,7 @@
           <a:p>
             <a:fld id="{8AAFBEC0-8583-44F4-923A-7642A0EA0A70}" type="datetimeFigureOut">
               <a:rPr lang="de-CH" smtClean="0"/>
-              <a:t>27.03.2024</a:t>
+              <a:t>31.05.2024</a:t>
             </a:fld>
             <a:endParaRPr lang="de-CH"/>
           </a:p>
@@ -776,7 +775,7 @@
           <a:p>
             <a:fld id="{8AAFBEC0-8583-44F4-923A-7642A0EA0A70}" type="datetimeFigureOut">
               <a:rPr lang="de-CH" smtClean="0"/>
-              <a:t>27.03.2024</a:t>
+              <a:t>31.05.2024</a:t>
             </a:fld>
             <a:endParaRPr lang="de-CH"/>
           </a:p>
@@ -1020,7 +1019,7 @@
           <a:p>
             <a:fld id="{8AAFBEC0-8583-44F4-923A-7642A0EA0A70}" type="datetimeFigureOut">
               <a:rPr lang="de-CH" smtClean="0"/>
-              <a:t>27.03.2024</a:t>
+              <a:t>31.05.2024</a:t>
             </a:fld>
             <a:endParaRPr lang="de-CH"/>
           </a:p>
@@ -1252,7 +1251,7 @@
           <a:p>
             <a:fld id="{8AAFBEC0-8583-44F4-923A-7642A0EA0A70}" type="datetimeFigureOut">
               <a:rPr lang="de-CH" smtClean="0"/>
-              <a:t>27.03.2024</a:t>
+              <a:t>31.05.2024</a:t>
             </a:fld>
             <a:endParaRPr lang="de-CH"/>
           </a:p>
@@ -1619,7 +1618,7 @@
           <a:p>
             <a:fld id="{8AAFBEC0-8583-44F4-923A-7642A0EA0A70}" type="datetimeFigureOut">
               <a:rPr lang="de-CH" smtClean="0"/>
-              <a:t>27.03.2024</a:t>
+              <a:t>31.05.2024</a:t>
             </a:fld>
             <a:endParaRPr lang="de-CH"/>
           </a:p>
@@ -1737,7 +1736,7 @@
           <a:p>
             <a:fld id="{8AAFBEC0-8583-44F4-923A-7642A0EA0A70}" type="datetimeFigureOut">
               <a:rPr lang="de-CH" smtClean="0"/>
-              <a:t>27.03.2024</a:t>
+              <a:t>31.05.2024</a:t>
             </a:fld>
             <a:endParaRPr lang="de-CH"/>
           </a:p>
@@ -1832,7 +1831,7 @@
           <a:p>
             <a:fld id="{8AAFBEC0-8583-44F4-923A-7642A0EA0A70}" type="datetimeFigureOut">
               <a:rPr lang="de-CH" smtClean="0"/>
-              <a:t>27.03.2024</a:t>
+              <a:t>31.05.2024</a:t>
             </a:fld>
             <a:endParaRPr lang="de-CH"/>
           </a:p>
@@ -2109,7 +2108,7 @@
           <a:p>
             <a:fld id="{8AAFBEC0-8583-44F4-923A-7642A0EA0A70}" type="datetimeFigureOut">
               <a:rPr lang="de-CH" smtClean="0"/>
-              <a:t>27.03.2024</a:t>
+              <a:t>31.05.2024</a:t>
             </a:fld>
             <a:endParaRPr lang="de-CH"/>
           </a:p>
@@ -2366,7 +2365,7 @@
           <a:p>
             <a:fld id="{8AAFBEC0-8583-44F4-923A-7642A0EA0A70}" type="datetimeFigureOut">
               <a:rPr lang="de-CH" smtClean="0"/>
-              <a:t>27.03.2024</a:t>
+              <a:t>31.05.2024</a:t>
             </a:fld>
             <a:endParaRPr lang="de-CH"/>
           </a:p>
@@ -2579,7 +2578,7 @@
           <a:p>
             <a:fld id="{8AAFBEC0-8583-44F4-923A-7642A0EA0A70}" type="datetimeFigureOut">
               <a:rPr lang="de-CH" smtClean="0"/>
-              <a:t>27.03.2024</a:t>
+              <a:t>31.05.2024</a:t>
             </a:fld>
             <a:endParaRPr lang="de-CH"/>
           </a:p>
@@ -2986,7 +2985,7 @@
       </p:grpSpPr>
       <p:pic>
         <p:nvPicPr>
-          <p:cNvPr id="4" name="Picture 3"/>
+          <p:cNvPr id="41" name="Picture 40"/>
           <p:cNvPicPr>
             <a:picLocks noChangeAspect="1"/>
           </p:cNvPicPr>
@@ -3006,6 +3005,36 @@
         </p:blipFill>
         <p:spPr>
           <a:xfrm>
+            <a:off x="28576" y="6828842"/>
+            <a:ext cx="3428999" cy="2277782"/>
+          </a:xfrm>
+          <a:prstGeom prst="rect">
+            <a:avLst/>
+          </a:prstGeom>
+        </p:spPr>
+      </p:pic>
+      <p:pic>
+        <p:nvPicPr>
+          <p:cNvPr id="4" name="Picture 3"/>
+          <p:cNvPicPr>
+            <a:picLocks noChangeAspect="1"/>
+          </p:cNvPicPr>
+          <p:nvPr/>
+        </p:nvPicPr>
+        <p:blipFill>
+          <a:blip r:embed="rId3" cstate="print">
+            <a:extLst>
+              <a:ext uri="{28A0092B-C50C-407E-A947-70E740481C1C}">
+                <a14:useLocalDpi xmlns:a14="http://schemas.microsoft.com/office/drawing/2010/main" val="0"/>
+              </a:ext>
+            </a:extLst>
+          </a:blip>
+          <a:stretch>
+            <a:fillRect/>
+          </a:stretch>
+        </p:blipFill>
+        <p:spPr>
+          <a:xfrm>
             <a:off x="0" y="2255"/>
             <a:ext cx="3425608" cy="2275529"/>
           </a:xfrm>
@@ -3023,7 +3052,7 @@
           <p:nvPr/>
         </p:nvPicPr>
         <p:blipFill>
-          <a:blip r:embed="rId3" cstate="print">
+          <a:blip r:embed="rId4" cstate="print">
             <a:extLst>
               <a:ext uri="{28A0092B-C50C-407E-A947-70E740481C1C}">
                 <a14:useLocalDpi xmlns:a14="http://schemas.microsoft.com/office/drawing/2010/main" val="0"/>
@@ -3283,7 +3312,7 @@
           <p:nvPr/>
         </p:nvPicPr>
         <p:blipFill>
-          <a:blip r:embed="rId4" cstate="print">
+          <a:blip r:embed="rId5" cstate="print">
             <a:extLst>
               <a:ext uri="{28A0092B-C50C-407E-A947-70E740481C1C}">
                 <a14:useLocalDpi xmlns:a14="http://schemas.microsoft.com/office/drawing/2010/main" val="0"/>
@@ -3313,7 +3342,7 @@
           <p:nvPr/>
         </p:nvPicPr>
         <p:blipFill>
-          <a:blip r:embed="rId5" cstate="print">
+          <a:blip r:embed="rId6" cstate="print">
             <a:extLst>
               <a:ext uri="{28A0092B-C50C-407E-A947-70E740481C1C}">
                 <a14:useLocalDpi xmlns:a14="http://schemas.microsoft.com/office/drawing/2010/main" val="0"/>
@@ -3458,36 +3487,6 @@
           <p:nvPr/>
         </p:nvPicPr>
         <p:blipFill>
-          <a:blip r:embed="rId6" cstate="print">
-            <a:extLst>
-              <a:ext uri="{28A0092B-C50C-407E-A947-70E740481C1C}">
-                <a14:useLocalDpi xmlns:a14="http://schemas.microsoft.com/office/drawing/2010/main" val="0"/>
-              </a:ext>
-            </a:extLst>
-          </a:blip>
-          <a:stretch>
-            <a:fillRect/>
-          </a:stretch>
-        </p:blipFill>
-        <p:spPr>
-          <a:xfrm>
-            <a:off x="0" y="4557819"/>
-            <a:ext cx="3429000" cy="2277783"/>
-          </a:xfrm>
-          <a:prstGeom prst="rect">
-            <a:avLst/>
-          </a:prstGeom>
-        </p:spPr>
-      </p:pic>
-      <p:pic>
-        <p:nvPicPr>
-          <p:cNvPr id="25" name="Picture 24"/>
-          <p:cNvPicPr>
-            <a:picLocks noChangeAspect="1"/>
-          </p:cNvPicPr>
-          <p:nvPr/>
-        </p:nvPicPr>
-        <p:blipFill>
           <a:blip r:embed="rId7" cstate="print">
             <a:extLst>
               <a:ext uri="{28A0092B-C50C-407E-A947-70E740481C1C}">
@@ -3501,7 +3500,7 @@
         </p:blipFill>
         <p:spPr>
           <a:xfrm>
-            <a:off x="3429000" y="4557818"/>
+            <a:off x="0" y="4557819"/>
             <a:ext cx="3429000" cy="2277783"/>
           </a:xfrm>
           <a:prstGeom prst="rect">
@@ -3511,7 +3510,7 @@
       </p:pic>
       <p:pic>
         <p:nvPicPr>
-          <p:cNvPr id="26" name="Picture 25"/>
+          <p:cNvPr id="25" name="Picture 24"/>
           <p:cNvPicPr>
             <a:picLocks noChangeAspect="1"/>
           </p:cNvPicPr>
@@ -3531,8 +3530,8 @@
         </p:blipFill>
         <p:spPr>
           <a:xfrm>
-            <a:off x="0" y="6831097"/>
-            <a:ext cx="3425608" cy="2275529"/>
+            <a:off x="3429000" y="4557818"/>
+            <a:ext cx="3429000" cy="2277783"/>
           </a:xfrm>
           <a:prstGeom prst="rect">
             <a:avLst/>
@@ -4130,8 +4129,8 @@
               <a:t> </a:t>
             </a:r>
             <a:r>
-              <a:rPr lang="de-CH" sz="900" dirty="0" smtClean="0"/>
-              <a:t>3UMG</a:t>
+              <a:rPr lang="de-CH" sz="900" dirty="0"/>
+              <a:t>WP1786180371</a:t>
             </a:r>
             <a:endParaRPr lang="de-CH" sz="900" dirty="0"/>
           </a:p>
@@ -5149,7 +5148,6 @@
                   <a:rPr lang="de-CH" sz="900" dirty="0"/>
                   <a:t> WP0534284051</a:t>
                 </a:r>
-                <a:endParaRPr lang="de-CH" sz="900" dirty="0"/>
               </a:p>
             </p:txBody>
           </p:sp>
@@ -5291,7 +5289,6 @@
                 <a:rPr lang="de-CH" sz="900" dirty="0"/>
                 <a:t> WP0871899911</a:t>
               </a:r>
-              <a:endParaRPr lang="de-CH" sz="900" dirty="0"/>
             </a:p>
           </p:txBody>
         </p:sp>
@@ -5460,188 +5457,6 @@
     <p:extLst>
       <p:ext uri="{BB962C8B-B14F-4D97-AF65-F5344CB8AC3E}">
         <p14:creationId xmlns:p14="http://schemas.microsoft.com/office/powerpoint/2010/main" val="3280565936"/>
-      </p:ext>
-    </p:extLst>
-  </p:cSld>
-  <p:clrMapOvr>
-    <a:masterClrMapping/>
-  </p:clrMapOvr>
-  <p:timing>
-    <p:tnLst>
-      <p:par>
-        <p:cTn id="1" dur="indefinite" restart="never" nodeType="tmRoot"/>
-      </p:par>
-    </p:tnLst>
-  </p:timing>
-</p:sld>
-</file>
-
-<file path=ppt/slides/slide3.xml><?xml version="1.0" encoding="utf-8"?>
-<p:sld xmlns:a="http://schemas.openxmlformats.org/drawingml/2006/main" xmlns:r="http://schemas.openxmlformats.org/officeDocument/2006/relationships" xmlns:p="http://schemas.openxmlformats.org/presentationml/2006/main">
-  <p:cSld>
-    <p:spTree>
-      <p:nvGrpSpPr>
-        <p:cNvPr id="1" name=""/>
-        <p:cNvGrpSpPr/>
-        <p:nvPr/>
-      </p:nvGrpSpPr>
-      <p:grpSpPr>
-        <a:xfrm>
-          <a:off x="0" y="0"/>
-          <a:ext cx="0" cy="0"/>
-          <a:chOff x="0" y="0"/>
-          <a:chExt cx="0" cy="0"/>
-        </a:xfrm>
-      </p:grpSpPr>
-      <p:pic>
-        <p:nvPicPr>
-          <p:cNvPr id="5" name="Picture 4"/>
-          <p:cNvPicPr>
-            <a:picLocks noChangeAspect="1"/>
-          </p:cNvPicPr>
-          <p:nvPr/>
-        </p:nvPicPr>
-        <p:blipFill>
-          <a:blip r:embed="rId2" cstate="print">
-            <a:extLst>
-              <a:ext uri="{28A0092B-C50C-407E-A947-70E740481C1C}">
-                <a14:useLocalDpi xmlns:a14="http://schemas.microsoft.com/office/drawing/2010/main" val="0"/>
-              </a:ext>
-            </a:extLst>
-          </a:blip>
-          <a:stretch>
-            <a:fillRect/>
-          </a:stretch>
-        </p:blipFill>
-        <p:spPr>
-          <a:xfrm>
-            <a:off x="0" y="12117"/>
-            <a:ext cx="3428999" cy="2277782"/>
-          </a:xfrm>
-          <a:prstGeom prst="rect">
-            <a:avLst/>
-          </a:prstGeom>
-        </p:spPr>
-      </p:pic>
-      <p:grpSp>
-        <p:nvGrpSpPr>
-          <p:cNvPr id="9" name="Group 8"/>
-          <p:cNvGrpSpPr/>
-          <p:nvPr/>
-        </p:nvGrpSpPr>
-        <p:grpSpPr>
-          <a:xfrm>
-            <a:off x="350837" y="-41388"/>
-            <a:ext cx="3019425" cy="230832"/>
-            <a:chOff x="-3105150" y="-31278"/>
-            <a:chExt cx="3019425" cy="230832"/>
-          </a:xfrm>
-        </p:grpSpPr>
-        <p:sp>
-          <p:nvSpPr>
-            <p:cNvPr id="10" name="Rectangle 9"/>
-            <p:cNvSpPr/>
-            <p:nvPr/>
-          </p:nvSpPr>
-          <p:spPr>
-            <a:xfrm>
-              <a:off x="-3105150" y="32755"/>
-              <a:ext cx="3019425" cy="123823"/>
-            </a:xfrm>
-            <a:prstGeom prst="rect">
-              <a:avLst/>
-            </a:prstGeom>
-            <a:solidFill>
-              <a:schemeClr val="bg1"/>
-            </a:solidFill>
-            <a:ln>
-              <a:noFill/>
-            </a:ln>
-          </p:spPr>
-          <p:style>
-            <a:lnRef idx="2">
-              <a:schemeClr val="accent1">
-                <a:shade val="50000"/>
-              </a:schemeClr>
-            </a:lnRef>
-            <a:fillRef idx="1">
-              <a:schemeClr val="accent1"/>
-            </a:fillRef>
-            <a:effectRef idx="0">
-              <a:schemeClr val="accent1"/>
-            </a:effectRef>
-            <a:fontRef idx="minor">
-              <a:schemeClr val="lt1"/>
-            </a:fontRef>
-          </p:style>
-          <p:txBody>
-            <a:bodyPr rtlCol="0" anchor="ctr"/>
-            <a:lstStyle/>
-            <a:p>
-              <a:pPr algn="ctr"/>
-              <a:endParaRPr lang="de-CH" dirty="0"/>
-            </a:p>
-          </p:txBody>
-        </p:sp>
-        <p:sp>
-          <p:nvSpPr>
-            <p:cNvPr id="11" name="TextBox 10"/>
-            <p:cNvSpPr txBox="1"/>
-            <p:nvPr/>
-          </p:nvSpPr>
-          <p:spPr>
-            <a:xfrm>
-              <a:off x="-2708276" y="-31278"/>
-              <a:ext cx="2314575" cy="230832"/>
-            </a:xfrm>
-            <a:prstGeom prst="rect">
-              <a:avLst/>
-            </a:prstGeom>
-            <a:noFill/>
-          </p:spPr>
-          <p:txBody>
-            <a:bodyPr wrap="square" rtlCol="0">
-              <a:spAutoFit/>
-            </a:bodyPr>
-            <a:lstStyle/>
-            <a:p>
-              <a:r>
-                <a:rPr lang="de-CH" sz="900" dirty="0" err="1" smtClean="0"/>
-                <a:t>Predicted</a:t>
-              </a:r>
-              <a:r>
-                <a:rPr lang="de-CH" sz="900" dirty="0" smtClean="0"/>
-                <a:t> </a:t>
-              </a:r>
-              <a:r>
-                <a:rPr lang="de-CH" sz="900" dirty="0" err="1" smtClean="0"/>
-                <a:t>lDDT</a:t>
-              </a:r>
-              <a:r>
-                <a:rPr lang="de-CH" sz="900" dirty="0" smtClean="0"/>
-                <a:t> per </a:t>
-              </a:r>
-              <a:r>
-                <a:rPr lang="de-CH" sz="900" dirty="0" err="1" smtClean="0"/>
-                <a:t>position</a:t>
-              </a:r>
-              <a:r>
-                <a:rPr lang="de-CH" sz="900" dirty="0"/>
-                <a:t> </a:t>
-              </a:r>
-              <a:r>
-                <a:rPr lang="de-CH" sz="900" dirty="0" smtClean="0"/>
-                <a:t>WP1786180371</a:t>
-              </a:r>
-              <a:endParaRPr lang="de-CH" sz="900" dirty="0"/>
-            </a:p>
-          </p:txBody>
-        </p:sp>
-      </p:grpSp>
-    </p:spTree>
-    <p:extLst>
-      <p:ext uri="{BB962C8B-B14F-4D97-AF65-F5344CB8AC3E}">
-        <p14:creationId xmlns:p14="http://schemas.microsoft.com/office/powerpoint/2010/main" val="3346882802"/>
       </p:ext>
     </p:extLst>
   </p:cSld>

</xml_diff>